<commit_message>
Added links to youtube videos
</commit_message>
<xml_diff>
--- a/tehtavat/tiedostot/maol/power_point/Racket-MAOL-5-6-turtle1.pptx
+++ b/tehtavat/tiedostot/maol/power_point/Racket-MAOL-5-6-turtle1.pptx
@@ -7790,10 +7790,9 @@
           <a:lstStyle/>
           <a:p>
             <a:r>
-              <a:rPr lang="fi-FI"/>
+              <a:rPr lang="fi-FI" dirty="0"/>
               <a:t>POISTETTU</a:t>
             </a:r>
-            <a:endParaRPr lang="fi-FI"/>
           </a:p>
         </p:txBody>
       </p:sp>
@@ -11901,7 +11900,7 @@
                 </a:solidFill>
                 <a:latin typeface="Arial" charset="0"/>
               </a:rPr>
-              <a:t> - funktion avulla ennetun määrän pikeleitä ja kääntyy </a:t>
+              <a:t> - funktion avulla ennetun määrän pikseleitä ja kääntyy </a:t>
             </a:r>
             <a:r>
               <a:rPr lang="fi-FI" sz="2800" dirty="0">

</xml_diff>